<commit_message>
updates per Eric K. comments
</commit_message>
<xml_diff>
--- a/vocabulary/SampledFeatureDecisionTreeV4.pptx
+++ b/vocabulary/SampledFeatureDecisionTreeV4.pptx
@@ -243,7 +243,7 @@
           <a:p>
             <a:fld id="{47AA5A20-FE08-4F04-A6A9-90A748025DF5}" type="datetimeFigureOut">
               <a:rPr lang="en-US" smtClean="0"/>
-              <a:t>6/9/2021</a:t>
+              <a:t>7/1/2021</a:t>
             </a:fld>
             <a:endParaRPr lang="en-US"/>
           </a:p>
@@ -413,7 +413,7 @@
           <a:p>
             <a:fld id="{47AA5A20-FE08-4F04-A6A9-90A748025DF5}" type="datetimeFigureOut">
               <a:rPr lang="en-US" smtClean="0"/>
-              <a:t>6/9/2021</a:t>
+              <a:t>7/1/2021</a:t>
             </a:fld>
             <a:endParaRPr lang="en-US"/>
           </a:p>
@@ -593,7 +593,7 @@
           <a:p>
             <a:fld id="{47AA5A20-FE08-4F04-A6A9-90A748025DF5}" type="datetimeFigureOut">
               <a:rPr lang="en-US" smtClean="0"/>
-              <a:t>6/9/2021</a:t>
+              <a:t>7/1/2021</a:t>
             </a:fld>
             <a:endParaRPr lang="en-US"/>
           </a:p>
@@ -763,7 +763,7 @@
           <a:p>
             <a:fld id="{47AA5A20-FE08-4F04-A6A9-90A748025DF5}" type="datetimeFigureOut">
               <a:rPr lang="en-US" smtClean="0"/>
-              <a:t>6/9/2021</a:t>
+              <a:t>7/1/2021</a:t>
             </a:fld>
             <a:endParaRPr lang="en-US"/>
           </a:p>
@@ -1007,7 +1007,7 @@
           <a:p>
             <a:fld id="{47AA5A20-FE08-4F04-A6A9-90A748025DF5}" type="datetimeFigureOut">
               <a:rPr lang="en-US" smtClean="0"/>
-              <a:t>6/9/2021</a:t>
+              <a:t>7/1/2021</a:t>
             </a:fld>
             <a:endParaRPr lang="en-US"/>
           </a:p>
@@ -1239,7 +1239,7 @@
           <a:p>
             <a:fld id="{47AA5A20-FE08-4F04-A6A9-90A748025DF5}" type="datetimeFigureOut">
               <a:rPr lang="en-US" smtClean="0"/>
-              <a:t>6/9/2021</a:t>
+              <a:t>7/1/2021</a:t>
             </a:fld>
             <a:endParaRPr lang="en-US"/>
           </a:p>
@@ -1606,7 +1606,7 @@
           <a:p>
             <a:fld id="{47AA5A20-FE08-4F04-A6A9-90A748025DF5}" type="datetimeFigureOut">
               <a:rPr lang="en-US" smtClean="0"/>
-              <a:t>6/9/2021</a:t>
+              <a:t>7/1/2021</a:t>
             </a:fld>
             <a:endParaRPr lang="en-US"/>
           </a:p>
@@ -1724,7 +1724,7 @@
           <a:p>
             <a:fld id="{47AA5A20-FE08-4F04-A6A9-90A748025DF5}" type="datetimeFigureOut">
               <a:rPr lang="en-US" smtClean="0"/>
-              <a:t>6/9/2021</a:t>
+              <a:t>7/1/2021</a:t>
             </a:fld>
             <a:endParaRPr lang="en-US"/>
           </a:p>
@@ -1819,7 +1819,7 @@
           <a:p>
             <a:fld id="{47AA5A20-FE08-4F04-A6A9-90A748025DF5}" type="datetimeFigureOut">
               <a:rPr lang="en-US" smtClean="0"/>
-              <a:t>6/9/2021</a:t>
+              <a:t>7/1/2021</a:t>
             </a:fld>
             <a:endParaRPr lang="en-US"/>
           </a:p>
@@ -2096,7 +2096,7 @@
           <a:p>
             <a:fld id="{47AA5A20-FE08-4F04-A6A9-90A748025DF5}" type="datetimeFigureOut">
               <a:rPr lang="en-US" smtClean="0"/>
-              <a:t>6/9/2021</a:t>
+              <a:t>7/1/2021</a:t>
             </a:fld>
             <a:endParaRPr lang="en-US"/>
           </a:p>
@@ -2353,7 +2353,7 @@
           <a:p>
             <a:fld id="{47AA5A20-FE08-4F04-A6A9-90A748025DF5}" type="datetimeFigureOut">
               <a:rPr lang="en-US" smtClean="0"/>
-              <a:t>6/9/2021</a:t>
+              <a:t>7/1/2021</a:t>
             </a:fld>
             <a:endParaRPr lang="en-US"/>
           </a:p>
@@ -2566,7 +2566,7 @@
           <a:p>
             <a:fld id="{47AA5A20-FE08-4F04-A6A9-90A748025DF5}" type="datetimeFigureOut">
               <a:rPr lang="en-US" smtClean="0"/>
-              <a:t>6/9/2021</a:t>
+              <a:t>7/1/2021</a:t>
             </a:fld>
             <a:endParaRPr lang="en-US"/>
           </a:p>
@@ -4264,8 +4264,8 @@
         </p:nvSpPr>
         <p:spPr>
           <a:xfrm>
-            <a:off x="9030468" y="4900738"/>
-            <a:ext cx="1508101" cy="646331"/>
+            <a:off x="8911742" y="4737807"/>
+            <a:ext cx="1508101" cy="923330"/>
           </a:xfrm>
           <a:prstGeom prst="rect">
             <a:avLst/>
@@ -4281,7 +4281,21 @@
             <a:pPr algn="ctr"/>
             <a:r>
               <a:rPr lang="en-US" b="1" dirty="0"/>
-              <a:t>Laboratory environment</a:t>
+              <a:t>Laboratory </a:t>
+            </a:r>
+            <a:r>
+              <a:rPr lang="en-US" b="1" i="0" dirty="0">
+                <a:solidFill>
+                  <a:srgbClr val="1D1C1D"/>
+                </a:solidFill>
+                <a:effectLst/>
+                <a:latin typeface="Slack-Lato"/>
+              </a:rPr>
+              <a:t>and curatorial</a:t>
+            </a:r>
+            <a:r>
+              <a:rPr lang="en-US" b="1" dirty="0"/>
+              <a:t> environment</a:t>
             </a:r>
           </a:p>
         </p:txBody>
@@ -4401,7 +4415,7 @@
         <p:spPr>
           <a:xfrm>
             <a:off x="11842980" y="4671198"/>
-            <a:ext cx="735990" cy="1307282"/>
+            <a:ext cx="691011" cy="1307282"/>
           </a:xfrm>
           <a:prstGeom prst="straightConnector1">
             <a:avLst/>
@@ -5367,8 +5381,8 @@
         </p:nvSpPr>
         <p:spPr>
           <a:xfrm>
-            <a:off x="11722763" y="5978480"/>
-            <a:ext cx="1712414" cy="646331"/>
+            <a:off x="11632805" y="5978480"/>
+            <a:ext cx="1802372" cy="646331"/>
           </a:xfrm>
           <a:prstGeom prst="rect">
             <a:avLst/>
@@ -5383,9 +5397,25 @@
           <a:p>
             <a:pPr algn="ctr"/>
             <a:r>
-              <a:rPr lang="en-US" b="1" dirty="0"/>
-              <a:t>Historic human occupation site</a:t>
-            </a:r>
+              <a:rPr lang="en-US" b="1" dirty="0">
+                <a:solidFill>
+                  <a:srgbClr val="1D1C1D"/>
+                </a:solidFill>
+                <a:latin typeface="Slack-Lato"/>
+              </a:rPr>
+              <a:t>S</a:t>
+            </a:r>
+            <a:r>
+              <a:rPr lang="en-US" b="1" i="0" dirty="0">
+                <a:solidFill>
+                  <a:srgbClr val="1D1C1D"/>
+                </a:solidFill>
+                <a:effectLst/>
+                <a:latin typeface="Slack-Lato"/>
+              </a:rPr>
+              <a:t>ite of past human activities</a:t>
+            </a:r>
+            <a:endParaRPr lang="en-US" b="1" dirty="0"/>
           </a:p>
         </p:txBody>
       </p:sp>
@@ -5991,7 +6021,7 @@
         </p:nvSpPr>
         <p:spPr>
           <a:xfrm>
-            <a:off x="9274594" y="5497030"/>
+            <a:off x="9141055" y="5625912"/>
             <a:ext cx="872510" cy="246221"/>
           </a:xfrm>
           <a:prstGeom prst="rect">
@@ -6333,7 +6363,7 @@
         <p:spPr>
           <a:xfrm>
             <a:off x="8911707" y="4278957"/>
-            <a:ext cx="872812" cy="621781"/>
+            <a:ext cx="754086" cy="458850"/>
           </a:xfrm>
           <a:prstGeom prst="straightConnector1">
             <a:avLst/>
@@ -6542,7 +6572,7 @@
         <p:spPr>
           <a:xfrm>
             <a:off x="11799631" y="6559389"/>
-            <a:ext cx="1808190" cy="553998"/>
+            <a:ext cx="1808190" cy="707886"/>
           </a:xfrm>
           <a:prstGeom prst="rect">
             <a:avLst/>
@@ -6557,7 +6587,7 @@
           <a:p>
             <a:r>
               <a:rPr lang="en-US" sz="1000" dirty="0"/>
-              <a:t>A place where humans have been and left evidence of their activity</a:t>
+              <a:t>A place where humans (including related prehistoric hominids)  have been and left evidence of their activity</a:t>
             </a:r>
           </a:p>
         </p:txBody>

</xml_diff>